<commit_message>
Add images of PGN file and data pipeline
</commit_message>
<xml_diff>
--- a/docs/Demonstration/Presentation - Machine Learning to Study Patterns in Chess Games.pptx
+++ b/docs/Demonstration/Presentation - Machine Learning to Study Patterns in Chess Games.pptx
@@ -5515,12 +5515,14 @@
         </p:nvSpPr>
         <p:spPr>
           <a:xfrm>
-            <a:off x="581192" y="2180496"/>
-            <a:ext cx="5074541" cy="3678303"/>
-          </a:xfrm>
-        </p:spPr>
-        <p:txBody>
-          <a:bodyPr/>
+            <a:off x="581193" y="2180496"/>
+            <a:ext cx="4346408" cy="3678303"/>
+          </a:xfrm>
+        </p:spPr>
+        <p:txBody>
+          <a:bodyPr>
+            <a:normAutofit lnSpcReduction="10000"/>
+          </a:bodyPr>
           <a:lstStyle/>
           <a:p>
             <a:r>
@@ -5552,8 +5554,65 @@
               <a:t>Sampled 6 million games per month</a:t>
             </a:r>
           </a:p>
-        </p:txBody>
-      </p:sp>
+          <a:p>
+            <a:r>
+              <a:rPr lang="en-GB" dirty="0"/>
+              <a:t>PGN (Portable Game Notation) files</a:t>
+            </a:r>
+          </a:p>
+          <a:p>
+            <a:pPr lvl="1"/>
+            <a:r>
+              <a:rPr lang="en-GB" dirty="0"/>
+              <a:t>Headers (e.g. White and Black players, their ratings, opening, game result)</a:t>
+            </a:r>
+          </a:p>
+          <a:p>
+            <a:pPr lvl="1"/>
+            <a:r>
+              <a:rPr lang="en-GB" dirty="0"/>
+              <a:t>List of moves in the game</a:t>
+            </a:r>
+          </a:p>
+        </p:txBody>
+      </p:sp>
+      <p:pic>
+        <p:nvPicPr>
+          <p:cNvPr id="10" name="Picture 9" descr="Text, letter&#10;&#10;Description automatically generated">
+            <a:extLst>
+              <a:ext uri="{FF2B5EF4-FFF2-40B4-BE49-F238E27FC236}">
+                <a16:creationId xmlns:a16="http://schemas.microsoft.com/office/drawing/2014/main" id="{79BDE6EB-8B8E-C203-B4AC-40C454E60CD5}"/>
+              </a:ext>
+            </a:extLst>
+          </p:cNvPr>
+          <p:cNvPicPr>
+            <a:picLocks noChangeAspect="1"/>
+          </p:cNvPicPr>
+          <p:nvPr/>
+        </p:nvPicPr>
+        <p:blipFill>
+          <a:blip r:embed="rId3"/>
+          <a:stretch>
+            <a:fillRect/>
+          </a:stretch>
+        </p:blipFill>
+        <p:spPr>
+          <a:xfrm>
+            <a:off x="4927602" y="2180496"/>
+            <a:ext cx="6682543" cy="3639600"/>
+          </a:xfrm>
+          <a:prstGeom prst="rect">
+            <a:avLst/>
+          </a:prstGeom>
+          <a:ln>
+            <a:solidFill>
+              <a:schemeClr val="bg1">
+                <a:lumMod val="75000"/>
+              </a:schemeClr>
+            </a:solidFill>
+          </a:ln>
+        </p:spPr>
+      </p:pic>
     </p:spTree>
     <p:extLst>
       <p:ext uri="{BB962C8B-B14F-4D97-AF65-F5344CB8AC3E}">
@@ -5630,33 +5689,15 @@
         </p:nvSpPr>
         <p:spPr>
           <a:xfrm>
-            <a:off x="581193" y="2180496"/>
-            <a:ext cx="6175207" cy="3678303"/>
-          </a:xfrm>
-        </p:spPr>
-        <p:txBody>
-          <a:bodyPr/>
+            <a:off x="581194" y="2180496"/>
+            <a:ext cx="3772692" cy="3678303"/>
+          </a:xfrm>
+        </p:spPr>
+        <p:txBody>
+          <a:bodyPr>
+            <a:normAutofit/>
+          </a:bodyPr>
           <a:lstStyle/>
-          <a:p>
-            <a:r>
-              <a:rPr lang="en-GB" dirty="0"/>
-              <a:t>PGN (Portable Game Notation) files as input</a:t>
-            </a:r>
-          </a:p>
-          <a:p>
-            <a:pPr lvl="1"/>
-            <a:r>
-              <a:rPr lang="en-GB" dirty="0"/>
-              <a:t>Headers (e.g. White and Black players, their ratings, opening, game result)</a:t>
-            </a:r>
-          </a:p>
-          <a:p>
-            <a:pPr lvl="1"/>
-            <a:r>
-              <a:rPr lang="en-GB" dirty="0"/>
-              <a:t>List of moves in the game</a:t>
-            </a:r>
-          </a:p>
           <a:p>
             <a:r>
               <a:rPr lang="en-GB" dirty="0"/>
@@ -5692,6 +5733,36 @@
           </a:p>
         </p:txBody>
       </p:sp>
+      <p:pic>
+        <p:nvPicPr>
+          <p:cNvPr id="9" name="Picture 8" descr="Timeline&#10;&#10;Description automatically generated">
+            <a:extLst>
+              <a:ext uri="{FF2B5EF4-FFF2-40B4-BE49-F238E27FC236}">
+                <a16:creationId xmlns:a16="http://schemas.microsoft.com/office/drawing/2014/main" id="{5E98C10D-FD5A-6116-589A-9FE864B4BC41}"/>
+              </a:ext>
+            </a:extLst>
+          </p:cNvPr>
+          <p:cNvPicPr>
+            <a:picLocks noChangeAspect="1"/>
+          </p:cNvPicPr>
+          <p:nvPr/>
+        </p:nvPicPr>
+        <p:blipFill>
+          <a:blip r:embed="rId3"/>
+          <a:stretch>
+            <a:fillRect/>
+          </a:stretch>
+        </p:blipFill>
+        <p:spPr>
+          <a:xfrm>
+            <a:off x="4681057" y="2180496"/>
+            <a:ext cx="6711635" cy="4458269"/>
+          </a:xfrm>
+          <a:prstGeom prst="rect">
+            <a:avLst/>
+          </a:prstGeom>
+        </p:spPr>
+      </p:pic>
     </p:spTree>
     <p:extLst>
       <p:ext uri="{BB962C8B-B14F-4D97-AF65-F5344CB8AC3E}">
@@ -5766,10 +5837,39 @@
             <p:ph idx="1"/>
           </p:nvPr>
         </p:nvSpPr>
-        <p:spPr/>
+        <p:spPr>
+          <a:xfrm>
+            <a:off x="581193" y="2180496"/>
+            <a:ext cx="6022808" cy="3678303"/>
+          </a:xfrm>
+        </p:spPr>
         <p:txBody>
           <a:bodyPr/>
           <a:lstStyle/>
+          <a:p>
+            <a:r>
+              <a:rPr lang="en-GB" dirty="0"/>
+              <a:t>Decision tree and random forest classifiers to predict the result of chess games</a:t>
+            </a:r>
+          </a:p>
+          <a:p>
+            <a:r>
+              <a:rPr lang="en-GB" dirty="0"/>
+              <a:t>Linear regression of popularity of base openings vs. their game results</a:t>
+            </a:r>
+          </a:p>
+          <a:p>
+            <a:r>
+              <a:rPr lang="en-GB" dirty="0"/>
+              <a:t>K-means clustering of base openings by game results</a:t>
+            </a:r>
+          </a:p>
+          <a:p>
+            <a:r>
+              <a:rPr lang="en-GB" dirty="0"/>
+              <a:t>K-means clustering of base openings by mean Euclidean distance of game results in their variations</a:t>
+            </a:r>
+          </a:p>
           <a:p>
             <a:endParaRPr lang="en-GB" dirty="0"/>
           </a:p>

</xml_diff>